<commit_message>
Ack messages, message ID and message list implemented
</commit_message>
<xml_diff>
--- a/Presentation.pptx
+++ b/Presentation.pptx
@@ -13,7 +13,9 @@
     <p:sldId id="261" r:id="rId7"/>
     <p:sldId id="262" r:id="rId8"/>
     <p:sldId id="263" r:id="rId9"/>
-    <p:sldId id="264" r:id="rId10"/>
+    <p:sldId id="265" r:id="rId10"/>
+    <p:sldId id="266" r:id="rId11"/>
+    <p:sldId id="264" r:id="rId12"/>
   </p:sldIdLst>
   <p:sldSz cx="12192000" cy="6858000"/>
   <p:notesSz cx="6858000" cy="9144000"/>
@@ -310,7 +312,7 @@
           <a:p>
             <a:fld id="{6266BBC4-D979-4FA7-BAFF-D97A5C9E58DE}" type="datetimeFigureOut">
               <a:rPr lang="en-GB" smtClean="0"/>
-              <a:t>28/02/2018</a:t>
+              <a:t>14/03/2018</a:t>
             </a:fld>
             <a:endParaRPr lang="en-GB"/>
           </a:p>
@@ -585,7 +587,7 @@
           <a:p>
             <a:fld id="{6266BBC4-D979-4FA7-BAFF-D97A5C9E58DE}" type="datetimeFigureOut">
               <a:rPr lang="en-GB" smtClean="0"/>
-              <a:t>28/02/2018</a:t>
+              <a:t>14/03/2018</a:t>
             </a:fld>
             <a:endParaRPr lang="en-GB"/>
           </a:p>
@@ -779,7 +781,7 @@
           <a:p>
             <a:fld id="{6266BBC4-D979-4FA7-BAFF-D97A5C9E58DE}" type="datetimeFigureOut">
               <a:rPr lang="en-GB" smtClean="0"/>
-              <a:t>28/02/2018</a:t>
+              <a:t>14/03/2018</a:t>
             </a:fld>
             <a:endParaRPr lang="en-GB"/>
           </a:p>
@@ -1052,7 +1054,7 @@
           <a:p>
             <a:fld id="{6266BBC4-D979-4FA7-BAFF-D97A5C9E58DE}" type="datetimeFigureOut">
               <a:rPr lang="en-GB" smtClean="0"/>
-              <a:t>28/02/2018</a:t>
+              <a:t>14/03/2018</a:t>
             </a:fld>
             <a:endParaRPr lang="en-GB"/>
           </a:p>
@@ -1393,7 +1395,7 @@
           <a:p>
             <a:fld id="{6266BBC4-D979-4FA7-BAFF-D97A5C9E58DE}" type="datetimeFigureOut">
               <a:rPr lang="en-GB" smtClean="0"/>
-              <a:t>28/02/2018</a:t>
+              <a:t>14/03/2018</a:t>
             </a:fld>
             <a:endParaRPr lang="en-GB"/>
           </a:p>
@@ -2016,7 +2018,7 @@
           <a:p>
             <a:fld id="{6266BBC4-D979-4FA7-BAFF-D97A5C9E58DE}" type="datetimeFigureOut">
               <a:rPr lang="en-GB" smtClean="0"/>
-              <a:t>28/02/2018</a:t>
+              <a:t>14/03/2018</a:t>
             </a:fld>
             <a:endParaRPr lang="en-GB"/>
           </a:p>
@@ -2876,7 +2878,7 @@
           <a:p>
             <a:fld id="{6266BBC4-D979-4FA7-BAFF-D97A5C9E58DE}" type="datetimeFigureOut">
               <a:rPr lang="en-GB" smtClean="0"/>
-              <a:t>28/02/2018</a:t>
+              <a:t>14/03/2018</a:t>
             </a:fld>
             <a:endParaRPr lang="en-GB"/>
           </a:p>
@@ -3046,7 +3048,7 @@
           <a:p>
             <a:fld id="{6266BBC4-D979-4FA7-BAFF-D97A5C9E58DE}" type="datetimeFigureOut">
               <a:rPr lang="en-GB" smtClean="0"/>
-              <a:t>28/02/2018</a:t>
+              <a:t>14/03/2018</a:t>
             </a:fld>
             <a:endParaRPr lang="en-GB"/>
           </a:p>
@@ -3226,7 +3228,7 @@
           <a:p>
             <a:fld id="{6266BBC4-D979-4FA7-BAFF-D97A5C9E58DE}" type="datetimeFigureOut">
               <a:rPr lang="en-GB" smtClean="0"/>
-              <a:t>28/02/2018</a:t>
+              <a:t>14/03/2018</a:t>
             </a:fld>
             <a:endParaRPr lang="en-GB"/>
           </a:p>
@@ -3396,7 +3398,7 @@
           <a:p>
             <a:fld id="{6266BBC4-D979-4FA7-BAFF-D97A5C9E58DE}" type="datetimeFigureOut">
               <a:rPr lang="en-GB" smtClean="0"/>
-              <a:t>28/02/2018</a:t>
+              <a:t>14/03/2018</a:t>
             </a:fld>
             <a:endParaRPr lang="en-GB"/>
           </a:p>
@@ -3643,7 +3645,7 @@
           <a:p>
             <a:fld id="{6266BBC4-D979-4FA7-BAFF-D97A5C9E58DE}" type="datetimeFigureOut">
               <a:rPr lang="en-GB" smtClean="0"/>
-              <a:t>28/02/2018</a:t>
+              <a:t>14/03/2018</a:t>
             </a:fld>
             <a:endParaRPr lang="en-GB"/>
           </a:p>
@@ -3935,7 +3937,7 @@
           <a:p>
             <a:fld id="{6266BBC4-D979-4FA7-BAFF-D97A5C9E58DE}" type="datetimeFigureOut">
               <a:rPr lang="en-GB" smtClean="0"/>
-              <a:t>28/02/2018</a:t>
+              <a:t>14/03/2018</a:t>
             </a:fld>
             <a:endParaRPr lang="en-GB"/>
           </a:p>
@@ -4379,7 +4381,7 @@
           <a:p>
             <a:fld id="{6266BBC4-D979-4FA7-BAFF-D97A5C9E58DE}" type="datetimeFigureOut">
               <a:rPr lang="en-GB" smtClean="0"/>
-              <a:t>28/02/2018</a:t>
+              <a:t>14/03/2018</a:t>
             </a:fld>
             <a:endParaRPr lang="en-GB"/>
           </a:p>
@@ -4497,7 +4499,7 @@
           <a:p>
             <a:fld id="{6266BBC4-D979-4FA7-BAFF-D97A5C9E58DE}" type="datetimeFigureOut">
               <a:rPr lang="en-GB" smtClean="0"/>
-              <a:t>28/02/2018</a:t>
+              <a:t>14/03/2018</a:t>
             </a:fld>
             <a:endParaRPr lang="en-GB"/>
           </a:p>
@@ -4592,7 +4594,7 @@
           <a:p>
             <a:fld id="{6266BBC4-D979-4FA7-BAFF-D97A5C9E58DE}" type="datetimeFigureOut">
               <a:rPr lang="en-GB" smtClean="0"/>
-              <a:t>28/02/2018</a:t>
+              <a:t>14/03/2018</a:t>
             </a:fld>
             <a:endParaRPr lang="en-GB"/>
           </a:p>
@@ -4871,7 +4873,7 @@
           <a:p>
             <a:fld id="{6266BBC4-D979-4FA7-BAFF-D97A5C9E58DE}" type="datetimeFigureOut">
               <a:rPr lang="en-GB" smtClean="0"/>
-              <a:t>28/02/2018</a:t>
+              <a:t>14/03/2018</a:t>
             </a:fld>
             <a:endParaRPr lang="en-GB"/>
           </a:p>
@@ -5146,7 +5148,7 @@
           <a:p>
             <a:fld id="{6266BBC4-D979-4FA7-BAFF-D97A5C9E58DE}" type="datetimeFigureOut">
               <a:rPr lang="en-GB" smtClean="0"/>
-              <a:t>28/02/2018</a:t>
+              <a:t>14/03/2018</a:t>
             </a:fld>
             <a:endParaRPr lang="en-GB"/>
           </a:p>
@@ -5575,7 +5577,7 @@
           <a:p>
             <a:fld id="{6266BBC4-D979-4FA7-BAFF-D97A5C9E58DE}" type="datetimeFigureOut">
               <a:rPr lang="en-GB" smtClean="0"/>
-              <a:t>28/02/2018</a:t>
+              <a:t>14/03/2018</a:t>
             </a:fld>
             <a:endParaRPr lang="en-GB"/>
           </a:p>
@@ -6184,6 +6186,229 @@
 </p:sld>
 </file>
 
+<file path=ppt/slides/slide10.xml><?xml version="1.0" encoding="utf-8"?>
+<p:sld xmlns:a="http://schemas.openxmlformats.org/drawingml/2006/main" xmlns:r="http://schemas.openxmlformats.org/officeDocument/2006/relationships" xmlns:p="http://schemas.openxmlformats.org/presentationml/2006/main">
+  <p:cSld>
+    <p:spTree>
+      <p:nvGrpSpPr>
+        <p:cNvPr id="1" name=""/>
+        <p:cNvGrpSpPr/>
+        <p:nvPr/>
+      </p:nvGrpSpPr>
+      <p:grpSpPr>
+        <a:xfrm>
+          <a:off x="0" y="0"/>
+          <a:ext cx="0" cy="0"/>
+          <a:chOff x="0" y="0"/>
+          <a:chExt cx="0" cy="0"/>
+        </a:xfrm>
+      </p:grpSpPr>
+      <p:sp>
+        <p:nvSpPr>
+          <p:cNvPr id="2" name="Title 1">
+            <a:extLst>
+              <a:ext uri="{FF2B5EF4-FFF2-40B4-BE49-F238E27FC236}">
+                <a16:creationId xmlns:a16="http://schemas.microsoft.com/office/drawing/2014/main" id="{DB9E3DDE-5C64-4899-8413-AE1FE86B43D5}"/>
+              </a:ext>
+            </a:extLst>
+          </p:cNvPr>
+          <p:cNvSpPr>
+            <a:spLocks noGrp="1"/>
+          </p:cNvSpPr>
+          <p:nvPr>
+            <p:ph type="title"/>
+          </p:nvPr>
+        </p:nvSpPr>
+        <p:spPr/>
+        <p:txBody>
+          <a:bodyPr/>
+          <a:lstStyle/>
+          <a:p>
+            <a:r>
+              <a:rPr lang="en-GB" dirty="0"/>
+              <a:t>Next Steps</a:t>
+            </a:r>
+          </a:p>
+        </p:txBody>
+      </p:sp>
+      <p:sp>
+        <p:nvSpPr>
+          <p:cNvPr id="3" name="Content Placeholder 2">
+            <a:extLst>
+              <a:ext uri="{FF2B5EF4-FFF2-40B4-BE49-F238E27FC236}">
+                <a16:creationId xmlns:a16="http://schemas.microsoft.com/office/drawing/2014/main" id="{FDCD0835-83D1-4038-A821-576198FE7D85}"/>
+              </a:ext>
+            </a:extLst>
+          </p:cNvPr>
+          <p:cNvSpPr>
+            <a:spLocks noGrp="1"/>
+          </p:cNvSpPr>
+          <p:nvPr>
+            <p:ph idx="1"/>
+          </p:nvPr>
+        </p:nvSpPr>
+        <p:spPr/>
+        <p:txBody>
+          <a:bodyPr/>
+          <a:lstStyle/>
+          <a:p>
+            <a:r>
+              <a:rPr lang="en-GB" dirty="0"/>
+              <a:t>Inputs create a message</a:t>
+            </a:r>
+          </a:p>
+          <a:p>
+            <a:endParaRPr lang="en-GB" dirty="0"/>
+          </a:p>
+          <a:p>
+            <a:r>
+              <a:rPr lang="en-GB" dirty="0"/>
+              <a:t>Struct to send</a:t>
+            </a:r>
+          </a:p>
+          <a:p>
+            <a:endParaRPr lang="en-GB" dirty="0"/>
+          </a:p>
+          <a:p>
+            <a:r>
+              <a:rPr lang="en-GB" dirty="0"/>
+              <a:t>Ack</a:t>
+            </a:r>
+          </a:p>
+          <a:p>
+            <a:endParaRPr lang="en-GB" dirty="0"/>
+          </a:p>
+          <a:p>
+            <a:r>
+              <a:rPr lang="en-GB" dirty="0"/>
+              <a:t>Output to CSV</a:t>
+            </a:r>
+          </a:p>
+          <a:p>
+            <a:endParaRPr lang="en-GB" dirty="0"/>
+          </a:p>
+          <a:p>
+            <a:endParaRPr lang="en-GB" dirty="0"/>
+          </a:p>
+        </p:txBody>
+      </p:sp>
+      <p:pic>
+        <p:nvPicPr>
+          <p:cNvPr id="6" name="Picture 5">
+            <a:extLst>
+              <a:ext uri="{FF2B5EF4-FFF2-40B4-BE49-F238E27FC236}">
+                <a16:creationId xmlns:a16="http://schemas.microsoft.com/office/drawing/2014/main" id="{F0A9D03F-4857-45D3-8F9B-A83F9EB900FB}"/>
+              </a:ext>
+            </a:extLst>
+          </p:cNvPr>
+          <p:cNvPicPr>
+            <a:picLocks noChangeAspect="1"/>
+          </p:cNvPicPr>
+          <p:nvPr/>
+        </p:nvPicPr>
+        <p:blipFill>
+          <a:blip r:embed="rId2">
+            <a:extLst>
+              <a:ext uri="{28A0092B-C50C-407E-A947-70E740481C1C}">
+                <a14:useLocalDpi xmlns:a14="http://schemas.microsoft.com/office/drawing/2010/main" val="0"/>
+              </a:ext>
+            </a:extLst>
+          </a:blip>
+          <a:stretch>
+            <a:fillRect/>
+          </a:stretch>
+        </p:blipFill>
+        <p:spPr>
+          <a:xfrm>
+            <a:off x="5221862" y="1853248"/>
+            <a:ext cx="6576188" cy="3126715"/>
+          </a:xfrm>
+          <a:prstGeom prst="rect">
+            <a:avLst/>
+          </a:prstGeom>
+        </p:spPr>
+      </p:pic>
+    </p:spTree>
+    <p:extLst>
+      <p:ext uri="{BB962C8B-B14F-4D97-AF65-F5344CB8AC3E}">
+        <p14:creationId xmlns:p14="http://schemas.microsoft.com/office/powerpoint/2010/main" val="3290406850"/>
+      </p:ext>
+    </p:extLst>
+  </p:cSld>
+  <p:clrMapOvr>
+    <a:masterClrMapping/>
+  </p:clrMapOvr>
+</p:sld>
+</file>
+
+<file path=ppt/slides/slide11.xml><?xml version="1.0" encoding="utf-8"?>
+<p:sld xmlns:a="http://schemas.openxmlformats.org/drawingml/2006/main" xmlns:r="http://schemas.openxmlformats.org/officeDocument/2006/relationships" xmlns:p="http://schemas.openxmlformats.org/presentationml/2006/main">
+  <p:cSld>
+    <p:spTree>
+      <p:nvGrpSpPr>
+        <p:cNvPr id="1" name=""/>
+        <p:cNvGrpSpPr/>
+        <p:nvPr/>
+      </p:nvGrpSpPr>
+      <p:grpSpPr>
+        <a:xfrm>
+          <a:off x="0" y="0"/>
+          <a:ext cx="0" cy="0"/>
+          <a:chOff x="0" y="0"/>
+          <a:chExt cx="0" cy="0"/>
+        </a:xfrm>
+      </p:grpSpPr>
+      <p:sp>
+        <p:nvSpPr>
+          <p:cNvPr id="2" name="Title 1">
+            <a:extLst>
+              <a:ext uri="{FF2B5EF4-FFF2-40B4-BE49-F238E27FC236}">
+                <a16:creationId xmlns:a16="http://schemas.microsoft.com/office/drawing/2014/main" id="{67659D77-DD3D-4F33-8863-4B825FF81AFD}"/>
+              </a:ext>
+            </a:extLst>
+          </p:cNvPr>
+          <p:cNvSpPr>
+            <a:spLocks noGrp="1"/>
+          </p:cNvSpPr>
+          <p:nvPr>
+            <p:ph type="ctrTitle"/>
+          </p:nvPr>
+        </p:nvSpPr>
+        <p:spPr>
+          <a:xfrm>
+            <a:off x="1154955" y="1456231"/>
+            <a:ext cx="8825658" cy="3329581"/>
+          </a:xfrm>
+        </p:spPr>
+        <p:txBody>
+          <a:bodyPr/>
+          <a:lstStyle/>
+          <a:p>
+            <a:pPr algn="ctr"/>
+            <a:r>
+              <a:rPr lang="en-GB" dirty="0"/>
+              <a:t>Questions</a:t>
+            </a:r>
+            <a:br>
+              <a:rPr lang="en-GB" dirty="0"/>
+            </a:br>
+            <a:endParaRPr lang="en-GB" dirty="0"/>
+          </a:p>
+        </p:txBody>
+      </p:sp>
+    </p:spTree>
+    <p:extLst>
+      <p:ext uri="{BB962C8B-B14F-4D97-AF65-F5344CB8AC3E}">
+        <p14:creationId xmlns:p14="http://schemas.microsoft.com/office/powerpoint/2010/main" val="2252571770"/>
+      </p:ext>
+    </p:extLst>
+  </p:cSld>
+  <p:clrMapOvr>
+    <a:masterClrMapping/>
+  </p:clrMapOvr>
+</p:sld>
+</file>
+
 <file path=ppt/slides/slide2.xml><?xml version="1.0" encoding="utf-8"?>
 <p:sld xmlns:a="http://schemas.openxmlformats.org/drawingml/2006/main" xmlns:r="http://schemas.openxmlformats.org/officeDocument/2006/relationships" xmlns:p="http://schemas.openxmlformats.org/presentationml/2006/main">
   <p:cSld>
@@ -6539,12 +6764,6 @@
           <a:bodyPr/>
           <a:lstStyle/>
           <a:p>
-            <a:r>
-              <a:rPr lang="en-GB" dirty="0"/>
-              <a:t>Work Ethic</a:t>
-            </a:r>
-          </a:p>
-          <a:p>
             <a:endParaRPr lang="en-GB" dirty="0"/>
           </a:p>
           <a:p>
@@ -6559,7 +6778,7 @@
           <a:p>
             <a:r>
               <a:rPr lang="en-GB" dirty="0"/>
-              <a:t>Over Scoped</a:t>
+              <a:t>Scoping</a:t>
             </a:r>
           </a:p>
           <a:p>
@@ -6820,7 +7039,7 @@
           <a:p>
             <a:r>
               <a:rPr lang="en-GB" dirty="0"/>
-              <a:t>Moving Forward</a:t>
+              <a:t>Fresh Start</a:t>
             </a:r>
           </a:p>
         </p:txBody>
@@ -6878,15 +7097,16 @@
             <a:pPr lvl="1"/>
             <a:r>
               <a:rPr lang="en-GB" dirty="0"/>
-              <a:t>Ack [Message Identifier]</a:t>
+              <a:t>Ack [Data Identifier]</a:t>
             </a:r>
           </a:p>
           <a:p>
             <a:pPr lvl="1"/>
             <a:r>
-              <a:rPr lang="en-GB" dirty="0"/>
-              <a:t>Serialised Struct to Save Data</a:t>
-            </a:r>
+              <a:rPr lang="en-GB"/>
+              <a:t>Serialised Struct</a:t>
+            </a:r>
+            <a:endParaRPr lang="en-GB" dirty="0"/>
           </a:p>
           <a:p>
             <a:pPr lvl="1"/>
@@ -6940,78 +7160,8 @@
         </p:blipFill>
         <p:spPr>
           <a:xfrm>
-            <a:off x="5806067" y="390813"/>
+            <a:off x="5763864" y="2052918"/>
             <a:ext cx="5643295" cy="3759845"/>
-          </a:xfrm>
-          <a:prstGeom prst="rect">
-            <a:avLst/>
-          </a:prstGeom>
-        </p:spPr>
-      </p:pic>
-      <p:pic>
-        <p:nvPicPr>
-          <p:cNvPr id="6" name="Picture 5">
-            <a:extLst>
-              <a:ext uri="{FF2B5EF4-FFF2-40B4-BE49-F238E27FC236}">
-                <a16:creationId xmlns:a16="http://schemas.microsoft.com/office/drawing/2014/main" id="{A61CE224-0569-428D-AD8E-D723B5E15259}"/>
-              </a:ext>
-            </a:extLst>
-          </p:cNvPr>
-          <p:cNvPicPr>
-            <a:picLocks noChangeAspect="1"/>
-          </p:cNvPicPr>
-          <p:nvPr/>
-        </p:nvPicPr>
-        <p:blipFill rotWithShape="1">
-          <a:blip r:embed="rId3">
-            <a:extLst>
-              <a:ext uri="{28A0092B-C50C-407E-A947-70E740481C1C}">
-                <a14:useLocalDpi xmlns:a14="http://schemas.microsoft.com/office/drawing/2010/main" val="0"/>
-              </a:ext>
-            </a:extLst>
-          </a:blip>
-          <a:srcRect t="52304"/>
-          <a:stretch/>
-        </p:blipFill>
-        <p:spPr>
-          <a:xfrm>
-            <a:off x="4005402" y="5219114"/>
-            <a:ext cx="2151566" cy="1423180"/>
-          </a:xfrm>
-          <a:prstGeom prst="rect">
-            <a:avLst/>
-          </a:prstGeom>
-        </p:spPr>
-      </p:pic>
-      <p:pic>
-        <p:nvPicPr>
-          <p:cNvPr id="7" name="Picture 6">
-            <a:extLst>
-              <a:ext uri="{FF2B5EF4-FFF2-40B4-BE49-F238E27FC236}">
-                <a16:creationId xmlns:a16="http://schemas.microsoft.com/office/drawing/2014/main" id="{7F6DE73E-9DDA-4A39-9697-473F8009995B}"/>
-              </a:ext>
-            </a:extLst>
-          </p:cNvPr>
-          <p:cNvPicPr>
-            <a:picLocks noChangeAspect="1"/>
-          </p:cNvPicPr>
-          <p:nvPr/>
-        </p:nvPicPr>
-        <p:blipFill rotWithShape="1">
-          <a:blip r:embed="rId3">
-            <a:extLst>
-              <a:ext uri="{28A0092B-C50C-407E-A947-70E740481C1C}">
-                <a14:useLocalDpi xmlns:a14="http://schemas.microsoft.com/office/drawing/2010/main" val="0"/>
-              </a:ext>
-            </a:extLst>
-          </a:blip>
-          <a:srcRect b="46243"/>
-          <a:stretch/>
-        </p:blipFill>
-        <p:spPr>
-          <a:xfrm>
-            <a:off x="8209298" y="4802047"/>
-            <a:ext cx="2151566" cy="1604015"/>
           </a:xfrm>
           <a:prstGeom prst="rect">
             <a:avLst/>
@@ -7372,7 +7522,7 @@
           <p:cNvPr id="2" name="Title 1">
             <a:extLst>
               <a:ext uri="{FF2B5EF4-FFF2-40B4-BE49-F238E27FC236}">
-                <a16:creationId xmlns:a16="http://schemas.microsoft.com/office/drawing/2014/main" id="{67659D77-DD3D-4F33-8863-4B825FF81AFD}"/>
+                <a16:creationId xmlns:a16="http://schemas.microsoft.com/office/drawing/2014/main" id="{357D4DAD-4B69-4E12-8D29-28417C153A0F}"/>
               </a:ext>
             </a:extLst>
           </p:cNvPr>
@@ -7380,35 +7530,109 @@
             <a:spLocks noGrp="1"/>
           </p:cNvSpPr>
           <p:nvPr>
-            <p:ph type="ctrTitle"/>
-          </p:nvPr>
-        </p:nvSpPr>
+            <p:ph type="title"/>
+          </p:nvPr>
+        </p:nvSpPr>
+        <p:spPr/>
+        <p:txBody>
+          <a:bodyPr/>
+          <a:lstStyle/>
+          <a:p>
+            <a:r>
+              <a:rPr lang="en-GB" dirty="0"/>
+              <a:t>Current Progress</a:t>
+            </a:r>
+          </a:p>
+        </p:txBody>
+      </p:sp>
+      <p:sp>
+        <p:nvSpPr>
+          <p:cNvPr id="3" name="Content Placeholder 2">
+            <a:extLst>
+              <a:ext uri="{FF2B5EF4-FFF2-40B4-BE49-F238E27FC236}">
+                <a16:creationId xmlns:a16="http://schemas.microsoft.com/office/drawing/2014/main" id="{4607123D-8977-41CD-8065-CE0A580FB77E}"/>
+              </a:ext>
+            </a:extLst>
+          </p:cNvPr>
+          <p:cNvSpPr>
+            <a:spLocks noGrp="1"/>
+          </p:cNvSpPr>
+          <p:nvPr>
+            <p:ph idx="1"/>
+          </p:nvPr>
+        </p:nvSpPr>
+        <p:spPr/>
+        <p:txBody>
+          <a:bodyPr>
+            <a:normAutofit/>
+          </a:bodyPr>
+          <a:lstStyle/>
+          <a:p>
+            <a:endParaRPr lang="en-GB" dirty="0"/>
+          </a:p>
+          <a:p>
+            <a:r>
+              <a:rPr lang="en-GB" dirty="0"/>
+              <a:t>Client Input</a:t>
+            </a:r>
+          </a:p>
+          <a:p>
+            <a:endParaRPr lang="en-GB" dirty="0"/>
+          </a:p>
+          <a:p>
+            <a:r>
+              <a:rPr lang="en-GB" dirty="0"/>
+              <a:t>Basic UDP</a:t>
+            </a:r>
+          </a:p>
+          <a:p>
+            <a:endParaRPr lang="en-GB" dirty="0"/>
+          </a:p>
+          <a:p>
+            <a:endParaRPr lang="en-GB" dirty="0"/>
+          </a:p>
+        </p:txBody>
+      </p:sp>
+      <p:pic>
+        <p:nvPicPr>
+          <p:cNvPr id="6" name="Picture 5">
+            <a:extLst>
+              <a:ext uri="{FF2B5EF4-FFF2-40B4-BE49-F238E27FC236}">
+                <a16:creationId xmlns:a16="http://schemas.microsoft.com/office/drawing/2014/main" id="{D3309F9D-FDFB-44F7-B33C-B5455DC6FF20}"/>
+              </a:ext>
+            </a:extLst>
+          </p:cNvPr>
+          <p:cNvPicPr>
+            <a:picLocks noChangeAspect="1"/>
+          </p:cNvPicPr>
+          <p:nvPr/>
+        </p:nvPicPr>
+        <p:blipFill>
+          <a:blip r:embed="rId2">
+            <a:extLst>
+              <a:ext uri="{28A0092B-C50C-407E-A947-70E740481C1C}">
+                <a14:useLocalDpi xmlns:a14="http://schemas.microsoft.com/office/drawing/2010/main" val="0"/>
+              </a:ext>
+            </a:extLst>
+          </a:blip>
+          <a:stretch>
+            <a:fillRect/>
+          </a:stretch>
+        </p:blipFill>
         <p:spPr>
           <a:xfrm>
-            <a:off x="1154955" y="1456231"/>
-            <a:ext cx="8825658" cy="3329581"/>
+            <a:off x="6023721" y="1270855"/>
+            <a:ext cx="4569251" cy="5224229"/>
           </a:xfrm>
+          <a:prstGeom prst="rect">
+            <a:avLst/>
+          </a:prstGeom>
         </p:spPr>
-        <p:txBody>
-          <a:bodyPr/>
-          <a:lstStyle/>
-          <a:p>
-            <a:pPr algn="ctr"/>
-            <a:r>
-              <a:rPr lang="en-GB" dirty="0"/>
-              <a:t>Questions</a:t>
-            </a:r>
-            <a:br>
-              <a:rPr lang="en-GB" dirty="0"/>
-            </a:br>
-            <a:endParaRPr lang="en-GB" dirty="0"/>
-          </a:p>
-        </p:txBody>
-      </p:sp>
+      </p:pic>
     </p:spTree>
     <p:extLst>
       <p:ext uri="{BB962C8B-B14F-4D97-AF65-F5344CB8AC3E}">
-        <p14:creationId xmlns:p14="http://schemas.microsoft.com/office/powerpoint/2010/main" val="2252571770"/>
+        <p14:creationId xmlns:p14="http://schemas.microsoft.com/office/powerpoint/2010/main" val="705642543"/>
       </p:ext>
     </p:extLst>
   </p:cSld>

</xml_diff>